<commit_message>
Doc edits: completed 1st pass
</commit_message>
<xml_diff>
--- a/docs/deployment_guide/images/starwind_qs_architecture_diagram.pptx
+++ b/docs/deployment_guide/images/starwind_qs_architecture_diagram.pptx
@@ -238,7 +238,7 @@
           <a:p>
             <a:fld id="{49A7721D-1176-A640-AC48-B82F78C92D56}" type="datetimeFigureOut">
               <a:rPr lang="en-US" smtClean="0"/>
-              <a:t>2/15/2022</a:t>
+              <a:t>2/17/2022</a:t>
             </a:fld>
             <a:endParaRPr lang="en-US" dirty="0"/>
           </a:p>
@@ -415,7 +415,7 @@
           <a:p>
             <a:fld id="{C884A089-FB25-6D46-9D21-F0F04A18BCA8}" type="datetimeFigureOut">
               <a:rPr lang="en-US" smtClean="0"/>
-              <a:t>2/15/2022</a:t>
+              <a:t>2/17/2022</a:t>
             </a:fld>
             <a:endParaRPr lang="en-US" dirty="0"/>
           </a:p>
@@ -1594,8 +1594,8 @@
         </p:nvSpPr>
         <p:spPr>
           <a:xfrm>
-            <a:off x="908988" y="4505227"/>
-            <a:ext cx="1124943" cy="430887"/>
+            <a:off x="858058" y="4533508"/>
+            <a:ext cx="1232435" cy="430887"/>
           </a:xfrm>
           <a:prstGeom prst="rect">
             <a:avLst/>
@@ -1613,7 +1613,7 @@
               <a:rPr lang="en-US" sz="1100" dirty="0">
                 <a:cs typeface="Arial" panose="020B0604020202020204" pitchFamily="34" charset="0"/>
               </a:rPr>
-              <a:t>StarWind storage node 1</a:t>
+              <a:t>StarWind VSAN storage node 1</a:t>
             </a:r>
           </a:p>
         </p:txBody>
@@ -1870,8 +1870,8 @@
         </p:nvSpPr>
         <p:spPr bwMode="auto">
           <a:xfrm>
-            <a:off x="1847014" y="4506814"/>
-            <a:ext cx="1507158" cy="600164"/>
+            <a:off x="1847014" y="4535095"/>
+            <a:ext cx="1507158" cy="430887"/>
           </a:xfrm>
           <a:prstGeom prst="rect">
             <a:avLst/>
@@ -2025,21 +2025,6 @@
                 <a:ea typeface="Amazon Ember" panose="020B0603020204020204" pitchFamily="34" charset="0"/>
                 <a:cs typeface="Arial" panose="020B0604020202020204" pitchFamily="34" charset="0"/>
               </a:rPr>
-              <a:t>or witness  </a:t>
-            </a:r>
-            <a:br>
-              <a:rPr lang="en-US" altLang="en-US" sz="1100" dirty="0">
-                <a:latin typeface="+mn-lt"/>
-                <a:ea typeface="Amazon Ember" panose="020B0603020204020204" pitchFamily="34" charset="0"/>
-                <a:cs typeface="Arial" panose="020B0604020202020204" pitchFamily="34" charset="0"/>
-              </a:rPr>
-            </a:br>
-            <a:r>
-              <a:rPr lang="en-US" altLang="en-US" sz="1100" dirty="0">
-                <a:latin typeface="+mn-lt"/>
-                <a:ea typeface="Amazon Ember" panose="020B0603020204020204" pitchFamily="34" charset="0"/>
-                <a:cs typeface="Arial" panose="020B0604020202020204" pitchFamily="34" charset="0"/>
-              </a:rPr>
               <a:t>network interface</a:t>
             </a:r>
           </a:p>
@@ -2074,7 +2059,7 @@
         </p:blipFill>
         <p:spPr bwMode="auto">
           <a:xfrm>
-            <a:off x="2371993" y="4084157"/>
+            <a:off x="2371993" y="4112438"/>
             <a:ext cx="457200" cy="457200"/>
           </a:xfrm>
           <a:prstGeom prst="rect">
@@ -2121,7 +2106,7 @@
         </p:nvSpPr>
         <p:spPr bwMode="auto">
           <a:xfrm>
-            <a:off x="1365023" y="5645475"/>
+            <a:off x="1365023" y="5541778"/>
             <a:ext cx="1503160" cy="430887"/>
           </a:xfrm>
           <a:prstGeom prst="rect">
@@ -2310,7 +2295,7 @@
         </p:blipFill>
         <p:spPr bwMode="auto">
           <a:xfrm>
-            <a:off x="1888003" y="5205542"/>
+            <a:off x="1888003" y="5101845"/>
             <a:ext cx="457200" cy="457200"/>
           </a:xfrm>
           <a:prstGeom prst="rect">
@@ -2370,7 +2355,7 @@
         </p:blipFill>
         <p:spPr bwMode="auto">
           <a:xfrm>
-            <a:off x="1247049" y="4084157"/>
+            <a:off x="1247049" y="4112438"/>
             <a:ext cx="457200" cy="457200"/>
           </a:xfrm>
           <a:prstGeom prst="rect">
@@ -2692,8 +2677,8 @@
         </p:nvSpPr>
         <p:spPr>
           <a:xfrm>
-            <a:off x="7980256" y="4505227"/>
-            <a:ext cx="1155530" cy="430887"/>
+            <a:off x="7939032" y="4533508"/>
+            <a:ext cx="1225035" cy="430887"/>
           </a:xfrm>
           <a:prstGeom prst="rect">
             <a:avLst/>
@@ -2711,7 +2696,7 @@
               <a:rPr lang="en-US" sz="1100" dirty="0">
                 <a:cs typeface="Arial" panose="020B0604020202020204" pitchFamily="34" charset="0"/>
               </a:rPr>
-              <a:t>StarWind storage node 2</a:t>
+              <a:t>StarWind VSAN storage node 2</a:t>
             </a:r>
           </a:p>
         </p:txBody>
@@ -2968,8 +2953,8 @@
         </p:nvSpPr>
         <p:spPr bwMode="auto">
           <a:xfrm>
-            <a:off x="8933160" y="4506814"/>
-            <a:ext cx="1507158" cy="600164"/>
+            <a:off x="8933160" y="4535095"/>
+            <a:ext cx="1507158" cy="430887"/>
           </a:xfrm>
           <a:prstGeom prst="rect">
             <a:avLst/>
@@ -3123,21 +3108,6 @@
                 <a:ea typeface="Amazon Ember" panose="020B0603020204020204" pitchFamily="34" charset="0"/>
                 <a:cs typeface="Arial" panose="020B0604020202020204" pitchFamily="34" charset="0"/>
               </a:rPr>
-              <a:t>or witness  </a:t>
-            </a:r>
-            <a:br>
-              <a:rPr lang="en-US" altLang="en-US" sz="1100" dirty="0">
-                <a:latin typeface="+mn-lt"/>
-                <a:ea typeface="Amazon Ember" panose="020B0603020204020204" pitchFamily="34" charset="0"/>
-                <a:cs typeface="Arial" panose="020B0604020202020204" pitchFamily="34" charset="0"/>
-              </a:rPr>
-            </a:br>
-            <a:r>
-              <a:rPr lang="en-US" altLang="en-US" sz="1100" dirty="0">
-                <a:latin typeface="+mn-lt"/>
-                <a:ea typeface="Amazon Ember" panose="020B0603020204020204" pitchFamily="34" charset="0"/>
-                <a:cs typeface="Arial" panose="020B0604020202020204" pitchFamily="34" charset="0"/>
-              </a:rPr>
               <a:t>network interface</a:t>
             </a:r>
           </a:p>
@@ -3172,7 +3142,7 @@
         </p:blipFill>
         <p:spPr bwMode="auto">
           <a:xfrm>
-            <a:off x="9458139" y="4084157"/>
+            <a:off x="9458139" y="4112438"/>
             <a:ext cx="457200" cy="457200"/>
           </a:xfrm>
           <a:prstGeom prst="rect">
@@ -3219,7 +3189,7 @@
         </p:nvSpPr>
         <p:spPr bwMode="auto">
           <a:xfrm>
-            <a:off x="8378755" y="5645475"/>
+            <a:off x="8378755" y="5541778"/>
             <a:ext cx="1581779" cy="430887"/>
           </a:xfrm>
           <a:prstGeom prst="rect">
@@ -3408,7 +3378,7 @@
         </p:blipFill>
         <p:spPr bwMode="auto">
           <a:xfrm>
-            <a:off x="8941044" y="5205542"/>
+            <a:off x="8941044" y="5101845"/>
             <a:ext cx="457200" cy="457200"/>
           </a:xfrm>
           <a:prstGeom prst="rect">
@@ -3468,7 +3438,7 @@
         </p:blipFill>
         <p:spPr bwMode="auto">
           <a:xfrm>
-            <a:off x="8333195" y="4084157"/>
+            <a:off x="8333195" y="4112438"/>
             <a:ext cx="457200" cy="457200"/>
           </a:xfrm>
           <a:prstGeom prst="rect">
@@ -3790,8 +3760,8 @@
         </p:nvSpPr>
         <p:spPr>
           <a:xfrm>
-            <a:off x="5137694" y="4505227"/>
-            <a:ext cx="1085967" cy="430887"/>
+            <a:off x="5048054" y="4533508"/>
+            <a:ext cx="1274729" cy="430887"/>
           </a:xfrm>
           <a:prstGeom prst="rect">
             <a:avLst/>
@@ -3809,7 +3779,7 @@
               <a:rPr lang="en-US" sz="1100" dirty="0">
                 <a:cs typeface="Arial" panose="020B0604020202020204" pitchFamily="34" charset="0"/>
               </a:rPr>
-              <a:t>StarWind witness node</a:t>
+              <a:t>StarWind VSAN witness node</a:t>
             </a:r>
           </a:p>
         </p:txBody>
@@ -3830,8 +3800,8 @@
         </p:nvSpPr>
         <p:spPr bwMode="auto">
           <a:xfrm>
-            <a:off x="6060171" y="4506814"/>
-            <a:ext cx="1507158" cy="600164"/>
+            <a:off x="6060171" y="4535095"/>
+            <a:ext cx="1507158" cy="430887"/>
           </a:xfrm>
           <a:prstGeom prst="rect">
             <a:avLst/>
@@ -3985,21 +3955,6 @@
                 <a:ea typeface="Amazon Ember" panose="020B0603020204020204" pitchFamily="34" charset="0"/>
                 <a:cs typeface="Arial" panose="020B0604020202020204" pitchFamily="34" charset="0"/>
               </a:rPr>
-              <a:t>or witness  </a:t>
-            </a:r>
-            <a:br>
-              <a:rPr lang="en-US" altLang="en-US" sz="1100" dirty="0">
-                <a:latin typeface="+mn-lt"/>
-                <a:ea typeface="Amazon Ember" panose="020B0603020204020204" pitchFamily="34" charset="0"/>
-                <a:cs typeface="Arial" panose="020B0604020202020204" pitchFamily="34" charset="0"/>
-              </a:rPr>
-            </a:br>
-            <a:r>
-              <a:rPr lang="en-US" altLang="en-US" sz="1100" dirty="0">
-                <a:latin typeface="+mn-lt"/>
-                <a:ea typeface="Amazon Ember" panose="020B0603020204020204" pitchFamily="34" charset="0"/>
-                <a:cs typeface="Arial" panose="020B0604020202020204" pitchFamily="34" charset="0"/>
-              </a:rPr>
               <a:t>network interface</a:t>
             </a:r>
           </a:p>
@@ -4034,7 +3989,7 @@
         </p:blipFill>
         <p:spPr bwMode="auto">
           <a:xfrm>
-            <a:off x="6585150" y="4084157"/>
+            <a:off x="6585150" y="4112438"/>
             <a:ext cx="457200" cy="457200"/>
           </a:xfrm>
           <a:prstGeom prst="rect">
@@ -4094,7 +4049,7 @@
         </p:blipFill>
         <p:spPr bwMode="auto">
           <a:xfrm>
-            <a:off x="5460206" y="4084157"/>
+            <a:off x="5460206" y="4112438"/>
             <a:ext cx="457200" cy="457200"/>
           </a:xfrm>
           <a:prstGeom prst="rect">
@@ -4143,7 +4098,7 @@
         </p:nvCxnSpPr>
         <p:spPr>
           <a:xfrm>
-            <a:off x="2345203" y="5434142"/>
+            <a:off x="2345203" y="5330445"/>
             <a:ext cx="6595841" cy="0"/>
           </a:xfrm>
           <a:prstGeom prst="straightConnector1">
@@ -4190,7 +4145,7 @@
         </p:nvCxnSpPr>
         <p:spPr>
           <a:xfrm>
-            <a:off x="2829193" y="4312757"/>
+            <a:off x="2829193" y="4341038"/>
             <a:ext cx="2631013" cy="0"/>
           </a:xfrm>
           <a:prstGeom prst="straightConnector1">
@@ -4237,7 +4192,7 @@
         </p:nvCxnSpPr>
         <p:spPr>
           <a:xfrm>
-            <a:off x="7042350" y="4312757"/>
+            <a:off x="7042350" y="4341038"/>
             <a:ext cx="1290845" cy="0"/>
           </a:xfrm>
           <a:prstGeom prst="straightConnector1">

</xml_diff>